<commit_message>
Update Week 5 Denoising Algorithms.pptx
</commit_message>
<xml_diff>
--- a/Weekly meeting slides/Week 5 Denoising Algorithms.pptx
+++ b/Weekly meeting slides/Week 5 Denoising Algorithms.pptx
@@ -6,10 +6,10 @@
     <p:sldMasterId id="2147483660" r:id="rId2"/>
   </p:sldMasterIdLst>
   <p:notesMasterIdLst>
-    <p:notesMasterId r:id="rId11"/>
+    <p:notesMasterId r:id="rId13"/>
   </p:notesMasterIdLst>
   <p:handoutMasterIdLst>
-    <p:handoutMasterId r:id="rId12"/>
+    <p:handoutMasterId r:id="rId14"/>
   </p:handoutMasterIdLst>
   <p:sldIdLst>
     <p:sldId id="452" r:id="rId3"/>
@@ -20,6 +20,8 @@
     <p:sldId id="458" r:id="rId8"/>
     <p:sldId id="459" r:id="rId9"/>
     <p:sldId id="422" r:id="rId10"/>
+    <p:sldId id="460" r:id="rId11"/>
+    <p:sldId id="461" r:id="rId12"/>
   </p:sldIdLst>
   <p:sldSz cx="9144000" cy="5143500" type="screen16x9"/>
   <p:notesSz cx="9874250" cy="6797675"/>
@@ -219,7 +221,7 @@
           <a:p>
             <a:fld id="{18304E0D-C731-4293-9B78-15AF47A387D5}" type="datetimeFigureOut">
               <a:rPr lang="zh-CN" altLang="en-US" smtClean="0"/>
-              <a:t>2021/6/18</a:t>
+              <a:t>2021/8/19</a:t>
             </a:fld>
             <a:endParaRPr lang="zh-CN" altLang="en-US"/>
           </a:p>
@@ -384,7 +386,7 @@
           <a:p>
             <a:fld id="{02A7D7D8-10E9-44B9-84AD-06141B53D128}" type="datetimeFigureOut">
               <a:rPr lang="zh-CN" altLang="en-US" smtClean="0"/>
-              <a:t>2021/6/18</a:t>
+              <a:t>2021/8/17</a:t>
             </a:fld>
             <a:endParaRPr lang="zh-CN" altLang="en-US"/>
           </a:p>
@@ -1009,7 +1011,7 @@
             <a:fld id="{530820CF-B880-4189-942D-D702A7CBA730}" type="datetimeFigureOut">
               <a:rPr lang="zh-CN" altLang="en-US" smtClean="0"/>
               <a:pPr/>
-              <a:t>2021/6/18</a:t>
+              <a:t>2021/8/17</a:t>
             </a:fld>
             <a:endParaRPr lang="zh-CN" altLang="en-US"/>
           </a:p>
@@ -1174,7 +1176,7 @@
             <a:fld id="{530820CF-B880-4189-942D-D702A7CBA730}" type="datetimeFigureOut">
               <a:rPr lang="zh-CN" altLang="en-US" smtClean="0"/>
               <a:pPr/>
-              <a:t>2021/6/18</a:t>
+              <a:t>2021/8/17</a:t>
             </a:fld>
             <a:endParaRPr lang="zh-CN" altLang="en-US"/>
           </a:p>
@@ -1349,7 +1351,7 @@
             <a:fld id="{530820CF-B880-4189-942D-D702A7CBA730}" type="datetimeFigureOut">
               <a:rPr lang="zh-CN" altLang="en-US" smtClean="0"/>
               <a:pPr/>
-              <a:t>2021/6/18</a:t>
+              <a:t>2021/8/17</a:t>
             </a:fld>
             <a:endParaRPr lang="zh-CN" altLang="en-US"/>
           </a:p>
@@ -1547,7 +1549,7 @@
               <a:pPr>
                 <a:defRPr/>
               </a:pPr>
-              <a:t>2021/6/18</a:t>
+              <a:t>2021/8/17</a:t>
             </a:fld>
             <a:endParaRPr lang="en-US">
               <a:solidFill>
@@ -1768,7 +1770,7 @@
               <a:pPr>
                 <a:defRPr/>
               </a:pPr>
-              <a:t>2021/6/18</a:t>
+              <a:t>2021/8/17</a:t>
             </a:fld>
             <a:endParaRPr lang="en-US">
               <a:solidFill>
@@ -2012,7 +2014,7 @@
               <a:pPr>
                 <a:defRPr/>
               </a:pPr>
-              <a:t>2021/6/18</a:t>
+              <a:t>2021/8/17</a:t>
             </a:fld>
             <a:endParaRPr lang="en-US">
               <a:solidFill>
@@ -2350,7 +2352,7 @@
               <a:pPr>
                 <a:defRPr/>
               </a:pPr>
-              <a:t>2021/6/18</a:t>
+              <a:t>2021/8/17</a:t>
             </a:fld>
             <a:endParaRPr lang="en-US">
               <a:solidFill>
@@ -2822,7 +2824,7 @@
               <a:pPr>
                 <a:defRPr/>
               </a:pPr>
-              <a:t>2021/6/18</a:t>
+              <a:t>2021/8/17</a:t>
             </a:fld>
             <a:endParaRPr lang="en-US">
               <a:solidFill>
@@ -2992,7 +2994,7 @@
               <a:pPr>
                 <a:defRPr/>
               </a:pPr>
-              <a:t>2021/6/18</a:t>
+              <a:t>2021/8/17</a:t>
             </a:fld>
             <a:endParaRPr lang="en-US">
               <a:solidFill>
@@ -3140,7 +3142,7 @@
               <a:pPr>
                 <a:defRPr/>
               </a:pPr>
-              <a:t>2021/6/18</a:t>
+              <a:t>2021/8/17</a:t>
             </a:fld>
             <a:endParaRPr lang="en-US">
               <a:solidFill>
@@ -3468,7 +3470,7 @@
               <a:pPr>
                 <a:defRPr/>
               </a:pPr>
-              <a:t>2021/6/18</a:t>
+              <a:t>2021/8/17</a:t>
             </a:fld>
             <a:endParaRPr lang="en-US">
               <a:solidFill>
@@ -3735,7 +3737,7 @@
             <a:fld id="{530820CF-B880-4189-942D-D702A7CBA730}" type="datetimeFigureOut">
               <a:rPr lang="zh-CN" altLang="en-US" smtClean="0"/>
               <a:pPr/>
-              <a:t>2021/6/18</a:t>
+              <a:t>2021/8/17</a:t>
             </a:fld>
             <a:endParaRPr lang="zh-CN" altLang="en-US"/>
           </a:p>
@@ -4046,7 +4048,7 @@
               <a:pPr>
                 <a:defRPr/>
               </a:pPr>
-              <a:t>2021/6/18</a:t>
+              <a:t>2021/8/17</a:t>
             </a:fld>
             <a:endParaRPr lang="en-US">
               <a:solidFill>
@@ -4267,7 +4269,7 @@
               <a:pPr>
                 <a:defRPr/>
               </a:pPr>
-              <a:t>2021/6/18</a:t>
+              <a:t>2021/8/17</a:t>
             </a:fld>
             <a:endParaRPr lang="en-US">
               <a:solidFill>
@@ -4498,7 +4500,7 @@
               <a:pPr>
                 <a:defRPr/>
               </a:pPr>
-              <a:t>2021/6/18</a:t>
+              <a:t>2021/8/17</a:t>
             </a:fld>
             <a:endParaRPr lang="en-US">
               <a:solidFill>
@@ -4781,7 +4783,7 @@
             <a:fld id="{530820CF-B880-4189-942D-D702A7CBA730}" type="datetimeFigureOut">
               <a:rPr lang="zh-CN" altLang="en-US" smtClean="0"/>
               <a:pPr/>
-              <a:t>2021/6/18</a:t>
+              <a:t>2021/8/17</a:t>
             </a:fld>
             <a:endParaRPr lang="zh-CN" altLang="en-US"/>
           </a:p>
@@ -5063,7 +5065,7 @@
             <a:fld id="{530820CF-B880-4189-942D-D702A7CBA730}" type="datetimeFigureOut">
               <a:rPr lang="zh-CN" altLang="en-US" smtClean="0"/>
               <a:pPr/>
-              <a:t>2021/6/18</a:t>
+              <a:t>2021/8/17</a:t>
             </a:fld>
             <a:endParaRPr lang="zh-CN" altLang="en-US"/>
           </a:p>
@@ -5479,7 +5481,7 @@
             <a:fld id="{530820CF-B880-4189-942D-D702A7CBA730}" type="datetimeFigureOut">
               <a:rPr lang="zh-CN" altLang="en-US" smtClean="0"/>
               <a:pPr/>
-              <a:t>2021/6/18</a:t>
+              <a:t>2021/8/17</a:t>
             </a:fld>
             <a:endParaRPr lang="zh-CN" altLang="en-US"/>
           </a:p>
@@ -5593,7 +5595,7 @@
             <a:fld id="{530820CF-B880-4189-942D-D702A7CBA730}" type="datetimeFigureOut">
               <a:rPr lang="zh-CN" altLang="en-US" smtClean="0"/>
               <a:pPr/>
-              <a:t>2021/6/18</a:t>
+              <a:t>2021/8/17</a:t>
             </a:fld>
             <a:endParaRPr lang="zh-CN" altLang="en-US"/>
           </a:p>
@@ -5685,7 +5687,7 @@
             <a:fld id="{530820CF-B880-4189-942D-D702A7CBA730}" type="datetimeFigureOut">
               <a:rPr lang="zh-CN" altLang="en-US" smtClean="0"/>
               <a:pPr/>
-              <a:t>2021/6/18</a:t>
+              <a:t>2021/8/17</a:t>
             </a:fld>
             <a:endParaRPr lang="zh-CN" altLang="en-US"/>
           </a:p>
@@ -5957,7 +5959,7 @@
             <a:fld id="{530820CF-B880-4189-942D-D702A7CBA730}" type="datetimeFigureOut">
               <a:rPr lang="zh-CN" altLang="en-US" smtClean="0"/>
               <a:pPr/>
-              <a:t>2021/6/18</a:t>
+              <a:t>2021/8/17</a:t>
             </a:fld>
             <a:endParaRPr lang="zh-CN" altLang="en-US"/>
           </a:p>
@@ -6206,7 +6208,7 @@
             <a:fld id="{530820CF-B880-4189-942D-D702A7CBA730}" type="datetimeFigureOut">
               <a:rPr lang="zh-CN" altLang="en-US" smtClean="0"/>
               <a:pPr/>
-              <a:t>2021/6/18</a:t>
+              <a:t>2021/8/17</a:t>
             </a:fld>
             <a:endParaRPr lang="zh-CN" altLang="en-US"/>
           </a:p>
@@ -6393,7 +6395,7 @@
             <a:fld id="{530820CF-B880-4189-942D-D702A7CBA730}" type="datetimeFigureOut">
               <a:rPr lang="zh-CN" altLang="en-US" smtClean="0"/>
               <a:pPr/>
-              <a:t>2021/6/18</a:t>
+              <a:t>2021/8/17</a:t>
             </a:fld>
             <a:endParaRPr lang="zh-CN" altLang="en-US"/>
           </a:p>
@@ -7039,7 +7041,7 @@
                 </a:spcAft>
                 <a:defRPr/>
               </a:pPr>
-              <a:t>2021/6/18</a:t>
+              <a:t>2021/8/17</a:t>
             </a:fld>
             <a:endParaRPr lang="en-US" dirty="0">
               <a:solidFill>
@@ -7895,6 +7897,246 @@
 </p:sld>
 </file>
 
+<file path=ppt/slides/slide10.xml><?xml version="1.0" encoding="utf-8"?>
+<p:sld xmlns:a="http://schemas.openxmlformats.org/drawingml/2006/main" xmlns:r="http://schemas.openxmlformats.org/officeDocument/2006/relationships" xmlns:p="http://schemas.openxmlformats.org/presentationml/2006/main">
+  <p:cSld>
+    <p:spTree>
+      <p:nvGrpSpPr>
+        <p:cNvPr id="1" name=""/>
+        <p:cNvGrpSpPr/>
+        <p:nvPr/>
+      </p:nvGrpSpPr>
+      <p:grpSpPr>
+        <a:xfrm>
+          <a:off x="0" y="0"/>
+          <a:ext cx="0" cy="0"/>
+          <a:chOff x="0" y="0"/>
+          <a:chExt cx="0" cy="0"/>
+        </a:xfrm>
+      </p:grpSpPr>
+      <p:sp>
+        <p:nvSpPr>
+          <p:cNvPr id="2" name="标题 1">
+            <a:extLst>
+              <a:ext uri="{FF2B5EF4-FFF2-40B4-BE49-F238E27FC236}">
+                <a16:creationId xmlns:a16="http://schemas.microsoft.com/office/drawing/2014/main" id="{182C6D8E-8BDE-48DA-86FF-BD8A5E56F219}"/>
+              </a:ext>
+            </a:extLst>
+          </p:cNvPr>
+          <p:cNvSpPr>
+            <a:spLocks noGrp="1"/>
+          </p:cNvSpPr>
+          <p:nvPr>
+            <p:ph type="title"/>
+          </p:nvPr>
+        </p:nvSpPr>
+        <p:spPr/>
+        <p:txBody>
+          <a:bodyPr/>
+          <a:lstStyle/>
+          <a:p>
+            <a:endParaRPr lang="zh-CN" altLang="en-US"/>
+          </a:p>
+        </p:txBody>
+      </p:sp>
+      <p:pic>
+        <p:nvPicPr>
+          <p:cNvPr id="4" name="内容占位符 8">
+            <a:extLst>
+              <a:ext uri="{FF2B5EF4-FFF2-40B4-BE49-F238E27FC236}">
+                <a16:creationId xmlns:a16="http://schemas.microsoft.com/office/drawing/2014/main" id="{5D4776D3-2603-4585-9C21-5591823A8976}"/>
+              </a:ext>
+            </a:extLst>
+          </p:cNvPr>
+          <p:cNvPicPr>
+            <a:picLocks noGrp="1" noChangeAspect="1"/>
+          </p:cNvPicPr>
+          <p:nvPr>
+            <p:ph idx="1"/>
+          </p:nvPr>
+        </p:nvPicPr>
+        <p:blipFill>
+          <a:blip r:embed="rId2" cstate="print">
+            <a:extLst>
+              <a:ext uri="{28A0092B-C50C-407E-A947-70E740481C1C}">
+                <a14:useLocalDpi xmlns:a14="http://schemas.microsoft.com/office/drawing/2010/main" val="0"/>
+              </a:ext>
+            </a:extLst>
+          </a:blip>
+          <a:stretch>
+            <a:fillRect/>
+          </a:stretch>
+        </p:blipFill>
+        <p:spPr>
+          <a:xfrm>
+            <a:off x="899592" y="1145122"/>
+            <a:ext cx="1315530" cy="1368152"/>
+          </a:xfrm>
+        </p:spPr>
+      </p:pic>
+      <p:sp>
+        <p:nvSpPr>
+          <p:cNvPr id="5" name="矩形: 圆角 4">
+            <a:extLst>
+              <a:ext uri="{FF2B5EF4-FFF2-40B4-BE49-F238E27FC236}">
+                <a16:creationId xmlns:a16="http://schemas.microsoft.com/office/drawing/2014/main" id="{9B024F22-BD0F-4EA7-ABB8-ED594F84AEFF}"/>
+              </a:ext>
+            </a:extLst>
+          </p:cNvPr>
+          <p:cNvSpPr/>
+          <p:nvPr/>
+        </p:nvSpPr>
+        <p:spPr>
+          <a:xfrm>
+            <a:off x="1115968" y="837307"/>
+            <a:ext cx="935869" cy="216024"/>
+          </a:xfrm>
+          <a:prstGeom prst="roundRect">
+            <a:avLst/>
+          </a:prstGeom>
+        </p:spPr>
+        <p:style>
+          <a:lnRef idx="2">
+            <a:schemeClr val="accent1">
+              <a:shade val="50000"/>
+            </a:schemeClr>
+          </a:lnRef>
+          <a:fillRef idx="1">
+            <a:schemeClr val="accent1"/>
+          </a:fillRef>
+          <a:effectRef idx="0">
+            <a:schemeClr val="accent1"/>
+          </a:effectRef>
+          <a:fontRef idx="minor">
+            <a:schemeClr val="lt1"/>
+          </a:fontRef>
+        </p:style>
+        <p:txBody>
+          <a:bodyPr rtlCol="0" anchor="ctr"/>
+          <a:lstStyle/>
+          <a:p>
+            <a:pPr algn="ctr"/>
+            <a:r>
+              <a:rPr lang="en-US" altLang="zh-CN" sz="1000" dirty="0"/>
+              <a:t>Original Data</a:t>
+            </a:r>
+            <a:endParaRPr lang="zh-CN" altLang="en-US" sz="1000" dirty="0"/>
+          </a:p>
+        </p:txBody>
+      </p:sp>
+      <p:sp>
+        <p:nvSpPr>
+          <p:cNvPr id="6" name="矩形: 圆角 5">
+            <a:extLst>
+              <a:ext uri="{FF2B5EF4-FFF2-40B4-BE49-F238E27FC236}">
+                <a16:creationId xmlns:a16="http://schemas.microsoft.com/office/drawing/2014/main" id="{82F93361-185D-4820-A8F4-CB974B74FD40}"/>
+              </a:ext>
+            </a:extLst>
+          </p:cNvPr>
+          <p:cNvSpPr/>
+          <p:nvPr/>
+        </p:nvSpPr>
+        <p:spPr>
+          <a:xfrm>
+            <a:off x="2555776" y="832853"/>
+            <a:ext cx="1256433" cy="216024"/>
+          </a:xfrm>
+          <a:prstGeom prst="roundRect">
+            <a:avLst/>
+          </a:prstGeom>
+        </p:spPr>
+        <p:style>
+          <a:lnRef idx="2">
+            <a:schemeClr val="accent1">
+              <a:shade val="50000"/>
+            </a:schemeClr>
+          </a:lnRef>
+          <a:fillRef idx="1">
+            <a:schemeClr val="accent1"/>
+          </a:fillRef>
+          <a:effectRef idx="0">
+            <a:schemeClr val="accent1"/>
+          </a:effectRef>
+          <a:fontRef idx="minor">
+            <a:schemeClr val="lt1"/>
+          </a:fontRef>
+        </p:style>
+        <p:txBody>
+          <a:bodyPr rtlCol="0" anchor="ctr"/>
+          <a:lstStyle/>
+          <a:p>
+            <a:pPr algn="ctr"/>
+            <a:r>
+              <a:rPr lang="en-US" altLang="zh-CN" sz="1000" dirty="0"/>
+              <a:t>Denoising Process</a:t>
+            </a:r>
+            <a:endParaRPr lang="zh-CN" altLang="en-US" sz="1000" dirty="0"/>
+          </a:p>
+        </p:txBody>
+      </p:sp>
+      <p:sp>
+        <p:nvSpPr>
+          <p:cNvPr id="7" name="矩形: 圆角 6">
+            <a:extLst>
+              <a:ext uri="{FF2B5EF4-FFF2-40B4-BE49-F238E27FC236}">
+                <a16:creationId xmlns:a16="http://schemas.microsoft.com/office/drawing/2014/main" id="{6C8648FB-CC88-410C-8F00-5BB3D41E4F86}"/>
+              </a:ext>
+            </a:extLst>
+          </p:cNvPr>
+          <p:cNvSpPr/>
+          <p:nvPr/>
+        </p:nvSpPr>
+        <p:spPr>
+          <a:xfrm>
+            <a:off x="4283968" y="832853"/>
+            <a:ext cx="1256433" cy="216024"/>
+          </a:xfrm>
+          <a:prstGeom prst="roundRect">
+            <a:avLst/>
+          </a:prstGeom>
+        </p:spPr>
+        <p:style>
+          <a:lnRef idx="2">
+            <a:schemeClr val="accent1">
+              <a:shade val="50000"/>
+            </a:schemeClr>
+          </a:lnRef>
+          <a:fillRef idx="1">
+            <a:schemeClr val="accent1"/>
+          </a:fillRef>
+          <a:effectRef idx="0">
+            <a:schemeClr val="accent1"/>
+          </a:effectRef>
+          <a:fontRef idx="minor">
+            <a:schemeClr val="lt1"/>
+          </a:fontRef>
+        </p:style>
+        <p:txBody>
+          <a:bodyPr rtlCol="0" anchor="ctr"/>
+          <a:lstStyle/>
+          <a:p>
+            <a:pPr algn="ctr"/>
+            <a:r>
+              <a:rPr lang="en-US" altLang="zh-CN" sz="1000"/>
+              <a:t>Feature Extraction</a:t>
+            </a:r>
+            <a:endParaRPr lang="zh-CN" altLang="en-US" sz="1000" dirty="0"/>
+          </a:p>
+        </p:txBody>
+      </p:sp>
+    </p:spTree>
+    <p:extLst>
+      <p:ext uri="{BB962C8B-B14F-4D97-AF65-F5344CB8AC3E}">
+        <p14:creationId xmlns:p14="http://schemas.microsoft.com/office/powerpoint/2010/main" val="2002733885"/>
+      </p:ext>
+    </p:extLst>
+  </p:cSld>
+  <p:clrMapOvr>
+    <a:masterClrMapping/>
+  </p:clrMapOvr>
+</p:sld>
+</file>
+
 <file path=ppt/slides/slide2.xml><?xml version="1.0" encoding="utf-8"?>
 <p:sld xmlns:a="http://schemas.openxmlformats.org/drawingml/2006/main" xmlns:r="http://schemas.openxmlformats.org/officeDocument/2006/relationships" xmlns:p="http://schemas.openxmlformats.org/presentationml/2006/main">
   <p:cSld>
@@ -9255,6 +9497,599 @@
       </p:transition>
     </mc:Fallback>
   </mc:AlternateContent>
+</p:sld>
+</file>
+
+<file path=ppt/slides/slide9.xml><?xml version="1.0" encoding="utf-8"?>
+<p:sld xmlns:a="http://schemas.openxmlformats.org/drawingml/2006/main" xmlns:r="http://schemas.openxmlformats.org/officeDocument/2006/relationships" xmlns:p="http://schemas.openxmlformats.org/presentationml/2006/main">
+  <p:cSld>
+    <p:spTree>
+      <p:nvGrpSpPr>
+        <p:cNvPr id="1" name=""/>
+        <p:cNvGrpSpPr/>
+        <p:nvPr/>
+      </p:nvGrpSpPr>
+      <p:grpSpPr>
+        <a:xfrm>
+          <a:off x="0" y="0"/>
+          <a:ext cx="0" cy="0"/>
+          <a:chOff x="0" y="0"/>
+          <a:chExt cx="0" cy="0"/>
+        </a:xfrm>
+      </p:grpSpPr>
+      <p:pic>
+        <p:nvPicPr>
+          <p:cNvPr id="9" name="内容占位符 8">
+            <a:extLst>
+              <a:ext uri="{FF2B5EF4-FFF2-40B4-BE49-F238E27FC236}">
+                <a16:creationId xmlns:a16="http://schemas.microsoft.com/office/drawing/2014/main" id="{AB64C72D-C6E4-4DE7-92F2-D70E51D45CF7}"/>
+              </a:ext>
+            </a:extLst>
+          </p:cNvPr>
+          <p:cNvPicPr>
+            <a:picLocks noGrp="1" noChangeAspect="1"/>
+          </p:cNvPicPr>
+          <p:nvPr>
+            <p:ph idx="1"/>
+          </p:nvPr>
+        </p:nvPicPr>
+        <p:blipFill>
+          <a:blip r:embed="rId2">
+            <a:extLst>
+              <a:ext uri="{28A0092B-C50C-407E-A947-70E740481C1C}">
+                <a14:useLocalDpi xmlns:a14="http://schemas.microsoft.com/office/drawing/2010/main" val="0"/>
+              </a:ext>
+            </a:extLst>
+          </a:blip>
+          <a:stretch>
+            <a:fillRect/>
+          </a:stretch>
+        </p:blipFill>
+        <p:spPr>
+          <a:xfrm>
+            <a:off x="1331640" y="51470"/>
+            <a:ext cx="4777453" cy="4968552"/>
+          </a:xfrm>
+        </p:spPr>
+      </p:pic>
+      <p:cxnSp>
+        <p:nvCxnSpPr>
+          <p:cNvPr id="11" name="直接箭头连接符 10">
+            <a:extLst>
+              <a:ext uri="{FF2B5EF4-FFF2-40B4-BE49-F238E27FC236}">
+                <a16:creationId xmlns:a16="http://schemas.microsoft.com/office/drawing/2014/main" id="{0460EC24-4139-414C-B78D-2EF63476FFB4}"/>
+              </a:ext>
+            </a:extLst>
+          </p:cNvPr>
+          <p:cNvCxnSpPr>
+            <a:cxnSpLocks/>
+          </p:cNvCxnSpPr>
+          <p:nvPr/>
+        </p:nvCxnSpPr>
+        <p:spPr>
+          <a:xfrm flipV="1">
+            <a:off x="2267744" y="555526"/>
+            <a:ext cx="576064" cy="504056"/>
+          </a:xfrm>
+          <a:prstGeom prst="straightConnector1">
+            <a:avLst/>
+          </a:prstGeom>
+          <a:ln w="19050">
+            <a:solidFill>
+              <a:srgbClr val="FF0000"/>
+            </a:solidFill>
+            <a:tailEnd type="triangle"/>
+          </a:ln>
+        </p:spPr>
+        <p:style>
+          <a:lnRef idx="1">
+            <a:schemeClr val="accent1"/>
+          </a:lnRef>
+          <a:fillRef idx="0">
+            <a:schemeClr val="accent1"/>
+          </a:fillRef>
+          <a:effectRef idx="0">
+            <a:schemeClr val="accent1"/>
+          </a:effectRef>
+          <a:fontRef idx="minor">
+            <a:schemeClr val="tx1"/>
+          </a:fontRef>
+        </p:style>
+      </p:cxnSp>
+      <p:cxnSp>
+        <p:nvCxnSpPr>
+          <p:cNvPr id="12" name="直接箭头连接符 11">
+            <a:extLst>
+              <a:ext uri="{FF2B5EF4-FFF2-40B4-BE49-F238E27FC236}">
+                <a16:creationId xmlns:a16="http://schemas.microsoft.com/office/drawing/2014/main" id="{6BB8219E-C016-4FC5-B8DE-E8556C266B01}"/>
+              </a:ext>
+            </a:extLst>
+          </p:cNvPr>
+          <p:cNvCxnSpPr>
+            <a:cxnSpLocks/>
+          </p:cNvCxnSpPr>
+          <p:nvPr/>
+        </p:nvCxnSpPr>
+        <p:spPr>
+          <a:xfrm flipH="1">
+            <a:off x="2267744" y="2063518"/>
+            <a:ext cx="576064" cy="504056"/>
+          </a:xfrm>
+          <a:prstGeom prst="straightConnector1">
+            <a:avLst/>
+          </a:prstGeom>
+          <a:ln w="19050">
+            <a:solidFill>
+              <a:srgbClr val="FF0000"/>
+            </a:solidFill>
+            <a:tailEnd type="triangle"/>
+          </a:ln>
+        </p:spPr>
+        <p:style>
+          <a:lnRef idx="1">
+            <a:schemeClr val="accent1"/>
+          </a:lnRef>
+          <a:fillRef idx="0">
+            <a:schemeClr val="accent1"/>
+          </a:fillRef>
+          <a:effectRef idx="0">
+            <a:schemeClr val="accent1"/>
+          </a:effectRef>
+          <a:fontRef idx="minor">
+            <a:schemeClr val="tx1"/>
+          </a:fontRef>
+        </p:style>
+      </p:cxnSp>
+      <p:cxnSp>
+        <p:nvCxnSpPr>
+          <p:cNvPr id="15" name="直接箭头连接符 14">
+            <a:extLst>
+              <a:ext uri="{FF2B5EF4-FFF2-40B4-BE49-F238E27FC236}">
+                <a16:creationId xmlns:a16="http://schemas.microsoft.com/office/drawing/2014/main" id="{7947E710-A552-4D14-9604-053506DD85D4}"/>
+              </a:ext>
+            </a:extLst>
+          </p:cNvPr>
+          <p:cNvCxnSpPr>
+            <a:cxnSpLocks/>
+          </p:cNvCxnSpPr>
+          <p:nvPr/>
+        </p:nvCxnSpPr>
+        <p:spPr>
+          <a:xfrm flipH="1">
+            <a:off x="4427984" y="2063518"/>
+            <a:ext cx="576064" cy="504056"/>
+          </a:xfrm>
+          <a:prstGeom prst="straightConnector1">
+            <a:avLst/>
+          </a:prstGeom>
+          <a:ln w="19050">
+            <a:solidFill>
+              <a:srgbClr val="FF0000"/>
+            </a:solidFill>
+            <a:tailEnd type="triangle"/>
+          </a:ln>
+        </p:spPr>
+        <p:style>
+          <a:lnRef idx="1">
+            <a:schemeClr val="accent1"/>
+          </a:lnRef>
+          <a:fillRef idx="0">
+            <a:schemeClr val="accent1"/>
+          </a:fillRef>
+          <a:effectRef idx="0">
+            <a:schemeClr val="accent1"/>
+          </a:effectRef>
+          <a:fontRef idx="minor">
+            <a:schemeClr val="tx1"/>
+          </a:fontRef>
+        </p:style>
+      </p:cxnSp>
+      <p:cxnSp>
+        <p:nvCxnSpPr>
+          <p:cNvPr id="16" name="直接箭头连接符 15">
+            <a:extLst>
+              <a:ext uri="{FF2B5EF4-FFF2-40B4-BE49-F238E27FC236}">
+                <a16:creationId xmlns:a16="http://schemas.microsoft.com/office/drawing/2014/main" id="{E47CE237-9034-4FB8-BD08-2F3354728352}"/>
+              </a:ext>
+            </a:extLst>
+          </p:cNvPr>
+          <p:cNvCxnSpPr>
+            <a:cxnSpLocks/>
+          </p:cNvCxnSpPr>
+          <p:nvPr/>
+        </p:nvCxnSpPr>
+        <p:spPr>
+          <a:xfrm flipV="1">
+            <a:off x="4427984" y="627534"/>
+            <a:ext cx="576064" cy="504056"/>
+          </a:xfrm>
+          <a:prstGeom prst="straightConnector1">
+            <a:avLst/>
+          </a:prstGeom>
+          <a:ln w="19050">
+            <a:solidFill>
+              <a:srgbClr val="FF0000"/>
+            </a:solidFill>
+            <a:tailEnd type="triangle"/>
+          </a:ln>
+        </p:spPr>
+        <p:style>
+          <a:lnRef idx="1">
+            <a:schemeClr val="accent1"/>
+          </a:lnRef>
+          <a:fillRef idx="0">
+            <a:schemeClr val="accent1"/>
+          </a:fillRef>
+          <a:effectRef idx="0">
+            <a:schemeClr val="accent1"/>
+          </a:effectRef>
+          <a:fontRef idx="minor">
+            <a:schemeClr val="tx1"/>
+          </a:fontRef>
+        </p:style>
+      </p:cxnSp>
+      <p:cxnSp>
+        <p:nvCxnSpPr>
+          <p:cNvPr id="17" name="直接箭头连接符 16">
+            <a:extLst>
+              <a:ext uri="{FF2B5EF4-FFF2-40B4-BE49-F238E27FC236}">
+                <a16:creationId xmlns:a16="http://schemas.microsoft.com/office/drawing/2014/main" id="{6B7D1C4B-A46F-4D99-899F-DBB26D2F1290}"/>
+              </a:ext>
+            </a:extLst>
+          </p:cNvPr>
+          <p:cNvCxnSpPr>
+            <a:cxnSpLocks/>
+          </p:cNvCxnSpPr>
+          <p:nvPr/>
+        </p:nvCxnSpPr>
+        <p:spPr>
+          <a:xfrm flipH="1" flipV="1">
+            <a:off x="5292080" y="3723878"/>
+            <a:ext cx="272607" cy="432048"/>
+          </a:xfrm>
+          <a:prstGeom prst="straightConnector1">
+            <a:avLst/>
+          </a:prstGeom>
+          <a:ln w="19050">
+            <a:solidFill>
+              <a:srgbClr val="FF0000"/>
+            </a:solidFill>
+            <a:tailEnd type="triangle"/>
+          </a:ln>
+        </p:spPr>
+        <p:style>
+          <a:lnRef idx="1">
+            <a:schemeClr val="accent1"/>
+          </a:lnRef>
+          <a:fillRef idx="0">
+            <a:schemeClr val="accent1"/>
+          </a:fillRef>
+          <a:effectRef idx="0">
+            <a:schemeClr val="accent1"/>
+          </a:effectRef>
+          <a:fontRef idx="minor">
+            <a:schemeClr val="tx1"/>
+          </a:fontRef>
+        </p:style>
+      </p:cxnSp>
+      <p:cxnSp>
+        <p:nvCxnSpPr>
+          <p:cNvPr id="19" name="直接箭头连接符 18">
+            <a:extLst>
+              <a:ext uri="{FF2B5EF4-FFF2-40B4-BE49-F238E27FC236}">
+                <a16:creationId xmlns:a16="http://schemas.microsoft.com/office/drawing/2014/main" id="{48065E2D-EAE7-470B-80CD-052EC7C9503A}"/>
+              </a:ext>
+            </a:extLst>
+          </p:cNvPr>
+          <p:cNvCxnSpPr>
+            <a:cxnSpLocks/>
+          </p:cNvCxnSpPr>
+          <p:nvPr/>
+        </p:nvCxnSpPr>
+        <p:spPr>
+          <a:xfrm flipH="1" flipV="1">
+            <a:off x="2987824" y="3723878"/>
+            <a:ext cx="272607" cy="432048"/>
+          </a:xfrm>
+          <a:prstGeom prst="straightConnector1">
+            <a:avLst/>
+          </a:prstGeom>
+          <a:ln w="19050">
+            <a:solidFill>
+              <a:srgbClr val="FF0000"/>
+            </a:solidFill>
+            <a:tailEnd type="triangle"/>
+          </a:ln>
+        </p:spPr>
+        <p:style>
+          <a:lnRef idx="1">
+            <a:schemeClr val="accent1"/>
+          </a:lnRef>
+          <a:fillRef idx="0">
+            <a:schemeClr val="accent1"/>
+          </a:fillRef>
+          <a:effectRef idx="0">
+            <a:schemeClr val="accent1"/>
+          </a:effectRef>
+          <a:fontRef idx="minor">
+            <a:schemeClr val="tx1"/>
+          </a:fontRef>
+        </p:style>
+      </p:cxnSp>
+      <p:sp>
+        <p:nvSpPr>
+          <p:cNvPr id="20" name="文本框 19">
+            <a:extLst>
+              <a:ext uri="{FF2B5EF4-FFF2-40B4-BE49-F238E27FC236}">
+                <a16:creationId xmlns:a16="http://schemas.microsoft.com/office/drawing/2014/main" id="{6D05B203-706F-42E3-894C-54D9A57FBB90}"/>
+              </a:ext>
+            </a:extLst>
+          </p:cNvPr>
+          <p:cNvSpPr txBox="1"/>
+          <p:nvPr/>
+        </p:nvSpPr>
+        <p:spPr>
+          <a:xfrm>
+            <a:off x="1935357" y="1059582"/>
+            <a:ext cx="1297787" cy="261610"/>
+          </a:xfrm>
+          <a:prstGeom prst="rect">
+            <a:avLst/>
+          </a:prstGeom>
+          <a:noFill/>
+        </p:spPr>
+        <p:txBody>
+          <a:bodyPr wrap="square" rtlCol="0">
+            <a:spAutoFit/>
+          </a:bodyPr>
+          <a:lstStyle/>
+          <a:p>
+            <a:r>
+              <a:rPr lang="en-US" altLang="zh-CN" sz="1100" dirty="0">
+                <a:solidFill>
+                  <a:srgbClr val="FF0000"/>
+                </a:solidFill>
+              </a:rPr>
+              <a:t>Cycle Increase</a:t>
+            </a:r>
+            <a:endParaRPr lang="zh-CN" altLang="en-US" sz="1100" dirty="0">
+              <a:solidFill>
+                <a:srgbClr val="FF0000"/>
+              </a:solidFill>
+            </a:endParaRPr>
+          </a:p>
+        </p:txBody>
+      </p:sp>
+      <p:sp>
+        <p:nvSpPr>
+          <p:cNvPr id="21" name="文本框 20">
+            <a:extLst>
+              <a:ext uri="{FF2B5EF4-FFF2-40B4-BE49-F238E27FC236}">
+                <a16:creationId xmlns:a16="http://schemas.microsoft.com/office/drawing/2014/main" id="{7071F3B0-18D3-4254-B532-9BCCCD0063D6}"/>
+              </a:ext>
+            </a:extLst>
+          </p:cNvPr>
+          <p:cNvSpPr txBox="1"/>
+          <p:nvPr/>
+        </p:nvSpPr>
+        <p:spPr>
+          <a:xfrm>
+            <a:off x="4216893" y="1059582"/>
+            <a:ext cx="1297787" cy="261610"/>
+          </a:xfrm>
+          <a:prstGeom prst="rect">
+            <a:avLst/>
+          </a:prstGeom>
+          <a:noFill/>
+        </p:spPr>
+        <p:txBody>
+          <a:bodyPr wrap="square" rtlCol="0">
+            <a:spAutoFit/>
+          </a:bodyPr>
+          <a:lstStyle/>
+          <a:p>
+            <a:r>
+              <a:rPr lang="en-US" altLang="zh-CN" sz="1100" dirty="0">
+                <a:solidFill>
+                  <a:srgbClr val="FF0000"/>
+                </a:solidFill>
+              </a:rPr>
+              <a:t>Cycle Increase</a:t>
+            </a:r>
+            <a:endParaRPr lang="zh-CN" altLang="en-US" sz="1100" dirty="0">
+              <a:solidFill>
+                <a:srgbClr val="FF0000"/>
+              </a:solidFill>
+            </a:endParaRPr>
+          </a:p>
+        </p:txBody>
+      </p:sp>
+      <p:sp>
+        <p:nvSpPr>
+          <p:cNvPr id="22" name="文本框 21">
+            <a:extLst>
+              <a:ext uri="{FF2B5EF4-FFF2-40B4-BE49-F238E27FC236}">
+                <a16:creationId xmlns:a16="http://schemas.microsoft.com/office/drawing/2014/main" id="{E61A5F5A-7EC5-4F68-AFB4-14E682B84B04}"/>
+              </a:ext>
+            </a:extLst>
+          </p:cNvPr>
+          <p:cNvSpPr txBox="1"/>
+          <p:nvPr/>
+        </p:nvSpPr>
+        <p:spPr>
+          <a:xfrm>
+            <a:off x="4067122" y="2719395"/>
+            <a:ext cx="1297787" cy="261610"/>
+          </a:xfrm>
+          <a:prstGeom prst="rect">
+            <a:avLst/>
+          </a:prstGeom>
+          <a:noFill/>
+        </p:spPr>
+        <p:txBody>
+          <a:bodyPr wrap="square" rtlCol="0">
+            <a:spAutoFit/>
+          </a:bodyPr>
+          <a:lstStyle/>
+          <a:p>
+            <a:r>
+              <a:rPr lang="en-US" altLang="zh-CN" sz="1100" dirty="0">
+                <a:solidFill>
+                  <a:srgbClr val="FF0000"/>
+                </a:solidFill>
+              </a:rPr>
+              <a:t>Cycle Increase</a:t>
+            </a:r>
+            <a:endParaRPr lang="zh-CN" altLang="en-US" sz="1100" dirty="0">
+              <a:solidFill>
+                <a:srgbClr val="FF0000"/>
+              </a:solidFill>
+            </a:endParaRPr>
+          </a:p>
+        </p:txBody>
+      </p:sp>
+      <p:sp>
+        <p:nvSpPr>
+          <p:cNvPr id="23" name="文本框 22">
+            <a:extLst>
+              <a:ext uri="{FF2B5EF4-FFF2-40B4-BE49-F238E27FC236}">
+                <a16:creationId xmlns:a16="http://schemas.microsoft.com/office/drawing/2014/main" id="{32C10914-519B-461A-948A-0BDCCE27A20D}"/>
+              </a:ext>
+            </a:extLst>
+          </p:cNvPr>
+          <p:cNvSpPr txBox="1"/>
+          <p:nvPr/>
+        </p:nvSpPr>
+        <p:spPr>
+          <a:xfrm>
+            <a:off x="2089653" y="2728327"/>
+            <a:ext cx="1297787" cy="261610"/>
+          </a:xfrm>
+          <a:prstGeom prst="rect">
+            <a:avLst/>
+          </a:prstGeom>
+          <a:noFill/>
+        </p:spPr>
+        <p:txBody>
+          <a:bodyPr wrap="square" rtlCol="0">
+            <a:spAutoFit/>
+          </a:bodyPr>
+          <a:lstStyle/>
+          <a:p>
+            <a:r>
+              <a:rPr lang="en-US" altLang="zh-CN" sz="1100" dirty="0">
+                <a:solidFill>
+                  <a:srgbClr val="FF0000"/>
+                </a:solidFill>
+              </a:rPr>
+              <a:t>Cycle Increase</a:t>
+            </a:r>
+            <a:endParaRPr lang="zh-CN" altLang="en-US" sz="1100" dirty="0">
+              <a:solidFill>
+                <a:srgbClr val="FF0000"/>
+              </a:solidFill>
+            </a:endParaRPr>
+          </a:p>
+        </p:txBody>
+      </p:sp>
+      <p:sp>
+        <p:nvSpPr>
+          <p:cNvPr id="24" name="文本框 23">
+            <a:extLst>
+              <a:ext uri="{FF2B5EF4-FFF2-40B4-BE49-F238E27FC236}">
+                <a16:creationId xmlns:a16="http://schemas.microsoft.com/office/drawing/2014/main" id="{19B8A467-60C1-4A1E-BB15-8F5D0F86501F}"/>
+              </a:ext>
+            </a:extLst>
+          </p:cNvPr>
+          <p:cNvSpPr txBox="1"/>
+          <p:nvPr/>
+        </p:nvSpPr>
+        <p:spPr>
+          <a:xfrm>
+            <a:off x="1962644" y="3926453"/>
+            <a:ext cx="1297787" cy="261610"/>
+          </a:xfrm>
+          <a:prstGeom prst="rect">
+            <a:avLst/>
+          </a:prstGeom>
+          <a:noFill/>
+        </p:spPr>
+        <p:txBody>
+          <a:bodyPr wrap="square" rtlCol="0">
+            <a:spAutoFit/>
+          </a:bodyPr>
+          <a:lstStyle/>
+          <a:p>
+            <a:r>
+              <a:rPr lang="en-US" altLang="zh-CN" sz="1100" dirty="0">
+                <a:solidFill>
+                  <a:srgbClr val="FF0000"/>
+                </a:solidFill>
+              </a:rPr>
+              <a:t>Cycle Increase</a:t>
+            </a:r>
+            <a:endParaRPr lang="zh-CN" altLang="en-US" sz="1100" dirty="0">
+              <a:solidFill>
+                <a:srgbClr val="FF0000"/>
+              </a:solidFill>
+            </a:endParaRPr>
+          </a:p>
+        </p:txBody>
+      </p:sp>
+      <p:sp>
+        <p:nvSpPr>
+          <p:cNvPr id="25" name="文本框 24">
+            <a:extLst>
+              <a:ext uri="{FF2B5EF4-FFF2-40B4-BE49-F238E27FC236}">
+                <a16:creationId xmlns:a16="http://schemas.microsoft.com/office/drawing/2014/main" id="{32C64D83-9B15-429E-AD07-0FB57FB9E509}"/>
+              </a:ext>
+            </a:extLst>
+          </p:cNvPr>
+          <p:cNvSpPr txBox="1"/>
+          <p:nvPr/>
+        </p:nvSpPr>
+        <p:spPr>
+          <a:xfrm>
+            <a:off x="4098780" y="3939465"/>
+            <a:ext cx="1297787" cy="261610"/>
+          </a:xfrm>
+          <a:prstGeom prst="rect">
+            <a:avLst/>
+          </a:prstGeom>
+          <a:noFill/>
+        </p:spPr>
+        <p:txBody>
+          <a:bodyPr wrap="square" rtlCol="0">
+            <a:spAutoFit/>
+          </a:bodyPr>
+          <a:lstStyle/>
+          <a:p>
+            <a:r>
+              <a:rPr lang="en-US" altLang="zh-CN" sz="1100" dirty="0">
+                <a:solidFill>
+                  <a:srgbClr val="FF0000"/>
+                </a:solidFill>
+              </a:rPr>
+              <a:t>Cycle Increase</a:t>
+            </a:r>
+            <a:endParaRPr lang="zh-CN" altLang="en-US" sz="1100" dirty="0">
+              <a:solidFill>
+                <a:srgbClr val="FF0000"/>
+              </a:solidFill>
+            </a:endParaRPr>
+          </a:p>
+        </p:txBody>
+      </p:sp>
+    </p:spTree>
+    <p:extLst>
+      <p:ext uri="{BB962C8B-B14F-4D97-AF65-F5344CB8AC3E}">
+        <p14:creationId xmlns:p14="http://schemas.microsoft.com/office/powerpoint/2010/main" val="2170633768"/>
+      </p:ext>
+    </p:extLst>
+  </p:cSld>
+  <p:clrMapOvr>
+    <a:masterClrMapping/>
+  </p:clrMapOvr>
 </p:sld>
 </file>
 

</xml_diff>